<commit_message>
update prior passive voice
</commit_message>
<xml_diff>
--- a/DEMO/progress_report.pptx
+++ b/DEMO/progress_report.pptx
@@ -11,11 +11,10 @@
     <p:sldId id="263" r:id="rId5"/>
     <p:sldId id="267" r:id="rId6"/>
     <p:sldId id="264" r:id="rId7"/>
-    <p:sldId id="266" r:id="rId8"/>
-    <p:sldId id="260" r:id="rId9"/>
-    <p:sldId id="261" r:id="rId10"/>
-    <p:sldId id="262" r:id="rId11"/>
-    <p:sldId id="265" r:id="rId12"/>
+    <p:sldId id="260" r:id="rId8"/>
+    <p:sldId id="261" r:id="rId9"/>
+    <p:sldId id="262" r:id="rId10"/>
+    <p:sldId id="265" r:id="rId11"/>
   </p:sldIdLst>
   <p:sldSz cx="12192000" cy="6858000"/>
   <p:notesSz cx="6858000" cy="9144000"/>
@@ -368,7 +367,7 @@
             <a:fld id="{B61BEF0D-F0BB-DE4B-95CE-6DB70DBA9567}" type="datetimeFigureOut">
               <a:rPr lang="en-US" dirty="0"/>
               <a:pPr/>
-              <a:t>2/19/2025</a:t>
+              <a:t>2/20/2025</a:t>
             </a:fld>
             <a:endParaRPr lang="en-US" dirty="0"/>
           </a:p>
@@ -627,7 +626,7 @@
             <a:fld id="{B61BEF0D-F0BB-DE4B-95CE-6DB70DBA9567}" type="datetimeFigureOut">
               <a:rPr lang="en-US" dirty="0"/>
               <a:pPr/>
-              <a:t>2/19/2025</a:t>
+              <a:t>2/20/2025</a:t>
             </a:fld>
             <a:endParaRPr lang="en-US" dirty="0"/>
           </a:p>
@@ -859,7 +858,7 @@
             <a:fld id="{B61BEF0D-F0BB-DE4B-95CE-6DB70DBA9567}" type="datetimeFigureOut">
               <a:rPr lang="en-US" dirty="0"/>
               <a:pPr/>
-              <a:t>2/19/2025</a:t>
+              <a:t>2/20/2025</a:t>
             </a:fld>
             <a:endParaRPr lang="en-US" dirty="0"/>
           </a:p>
@@ -1096,7 +1095,7 @@
             <a:fld id="{B61BEF0D-F0BB-DE4B-95CE-6DB70DBA9567}" type="datetimeFigureOut">
               <a:rPr lang="en-US" dirty="0"/>
               <a:pPr/>
-              <a:t>2/19/2025</a:t>
+              <a:t>2/20/2025</a:t>
             </a:fld>
             <a:endParaRPr lang="en-US" dirty="0"/>
           </a:p>
@@ -1400,7 +1399,7 @@
             <a:fld id="{B61BEF0D-F0BB-DE4B-95CE-6DB70DBA9567}" type="datetimeFigureOut">
               <a:rPr lang="en-US" dirty="0"/>
               <a:pPr/>
-              <a:t>2/19/2025</a:t>
+              <a:t>2/20/2025</a:t>
             </a:fld>
             <a:endParaRPr lang="en-US" dirty="0"/>
           </a:p>
@@ -1699,7 +1698,7 @@
             <a:fld id="{B61BEF0D-F0BB-DE4B-95CE-6DB70DBA9567}" type="datetimeFigureOut">
               <a:rPr lang="en-US" dirty="0"/>
               <a:pPr/>
-              <a:t>2/19/2025</a:t>
+              <a:t>2/20/2025</a:t>
             </a:fld>
             <a:endParaRPr lang="en-US" dirty="0"/>
           </a:p>
@@ -2118,7 +2117,7 @@
             <a:fld id="{B61BEF0D-F0BB-DE4B-95CE-6DB70DBA9567}" type="datetimeFigureOut">
               <a:rPr lang="en-US" dirty="0"/>
               <a:pPr/>
-              <a:t>2/19/2025</a:t>
+              <a:t>2/20/2025</a:t>
             </a:fld>
             <a:endParaRPr lang="en-US" dirty="0"/>
           </a:p>
@@ -2277,7 +2276,7 @@
             <a:fld id="{B61BEF0D-F0BB-DE4B-95CE-6DB70DBA9567}" type="datetimeFigureOut">
               <a:rPr lang="en-US" dirty="0"/>
               <a:pPr/>
-              <a:t>2/19/2025</a:t>
+              <a:t>2/20/2025</a:t>
             </a:fld>
             <a:endParaRPr lang="en-US" dirty="0"/>
           </a:p>
@@ -2369,7 +2368,7 @@
             <a:fld id="{B61BEF0D-F0BB-DE4B-95CE-6DB70DBA9567}" type="datetimeFigureOut">
               <a:rPr lang="en-US" dirty="0"/>
               <a:pPr/>
-              <a:t>2/19/2025</a:t>
+              <a:t>2/20/2025</a:t>
             </a:fld>
             <a:endParaRPr lang="en-US" dirty="0"/>
           </a:p>
@@ -2744,7 +2743,7 @@
             <a:fld id="{B61BEF0D-F0BB-DE4B-95CE-6DB70DBA9567}" type="datetimeFigureOut">
               <a:rPr lang="en-US" dirty="0"/>
               <a:pPr/>
-              <a:t>2/19/2025</a:t>
+              <a:t>2/20/2025</a:t>
             </a:fld>
             <a:endParaRPr lang="en-US" dirty="0"/>
           </a:p>
@@ -3030,7 +3029,7 @@
             <a:fld id="{B61BEF0D-F0BB-DE4B-95CE-6DB70DBA9567}" type="datetimeFigureOut">
               <a:rPr lang="en-US" dirty="0"/>
               <a:pPr/>
-              <a:t>2/19/2025</a:t>
+              <a:t>2/20/2025</a:t>
             </a:fld>
             <a:endParaRPr lang="en-US" dirty="0"/>
           </a:p>
@@ -3238,7 +3237,7 @@
             <a:fld id="{B61BEF0D-F0BB-DE4B-95CE-6DB70DBA9567}" type="datetimeFigureOut">
               <a:rPr lang="en-US" dirty="0"/>
               <a:pPr/>
-              <a:t>2/19/2025</a:t>
+              <a:t>2/20/2025</a:t>
             </a:fld>
             <a:endParaRPr lang="en-US" dirty="0"/>
           </a:p>
@@ -4159,6 +4158,13 @@
   <p:clrMapOvr>
     <a:masterClrMapping/>
   </p:clrMapOvr>
+  <p:timing>
+    <p:tnLst>
+      <p:par>
+        <p:cTn id="1" dur="indefinite" restart="never" nodeType="tmRoot"/>
+      </p:par>
+    </p:tnLst>
+  </p:timing>
 </p:sld>
 </file>
 
@@ -4195,8 +4201,12 @@
           <a:lstStyle/>
           <a:p>
             <a:r>
-              <a:rPr lang="en-US" b="1" dirty="0"/>
-              <a:t>Remaining Work &amp; Future-Plans</a:t>
+              <a:rPr lang="en-US" dirty="0"/>
+              <a:t>Thank </a:t>
+            </a:r>
+            <a:r>
+              <a:rPr lang="en-US" dirty="0" smtClean="0"/>
+              <a:t>you !</a:t>
             </a:r>
             <a:endParaRPr lang="en-US" dirty="0"/>
           </a:p>
@@ -4210,188 +4220,6 @@
           </p:cNvSpPr>
           <p:nvPr>
             <p:ph idx="1"/>
-          </p:nvPr>
-        </p:nvSpPr>
-        <p:spPr/>
-        <p:txBody>
-          <a:bodyPr anchor="t"/>
-          <a:lstStyle/>
-          <a:p>
-            <a:r>
-              <a:rPr lang="en-US" dirty="0"/>
-              <a:t>The most challenging task is lane violation </a:t>
-            </a:r>
-            <a:r>
-              <a:rPr lang="en-US" dirty="0" smtClean="0"/>
-              <a:t>detection also depends the downstream app. (</a:t>
-            </a:r>
-            <a:r>
-              <a:rPr lang="en-US" dirty="0" smtClean="0">
-                <a:solidFill>
-                  <a:schemeClr val="accent5">
-                    <a:lumMod val="50000"/>
-                  </a:schemeClr>
-                </a:solidFill>
-              </a:rPr>
-              <a:t> Working Progress</a:t>
-            </a:r>
-            <a:r>
-              <a:rPr lang="en-US" dirty="0" smtClean="0"/>
-              <a:t>)</a:t>
-            </a:r>
-          </a:p>
-          <a:p>
-            <a:pPr lvl="1"/>
-            <a:r>
-              <a:rPr lang="en-US" dirty="0"/>
-              <a:t>Now I am starting to fine-tune it for Sri Lankan </a:t>
-            </a:r>
-            <a:r>
-              <a:rPr lang="en-US" dirty="0" smtClean="0"/>
-              <a:t>lanes ( data processing annotation time consuming task..)</a:t>
-            </a:r>
-          </a:p>
-          <a:p>
-            <a:r>
-              <a:rPr lang="en-US" dirty="0"/>
-              <a:t>Helmet violation detection started with a pre-existing YOLO model; fine-tuning is needed as well.</a:t>
-            </a:r>
-            <a:r>
-              <a:rPr lang="en-US" dirty="0" smtClean="0"/>
-              <a:t> </a:t>
-            </a:r>
-            <a:r>
-              <a:rPr lang="en-US" dirty="0" smtClean="0">
-                <a:solidFill>
-                  <a:schemeClr val="accent5">
-                    <a:lumMod val="50000"/>
-                  </a:schemeClr>
-                </a:solidFill>
-              </a:rPr>
-              <a:t>(Not started)</a:t>
-            </a:r>
-          </a:p>
-          <a:p>
-            <a:r>
-              <a:rPr lang="en-US" dirty="0" smtClean="0"/>
-              <a:t>Illegal parking violation detection. </a:t>
-            </a:r>
-            <a:r>
-              <a:rPr lang="en-US" dirty="0" smtClean="0">
-                <a:solidFill>
-                  <a:schemeClr val="accent5">
-                    <a:lumMod val="50000"/>
-                  </a:schemeClr>
-                </a:solidFill>
-              </a:rPr>
-              <a:t>( Not started)</a:t>
-            </a:r>
-          </a:p>
-          <a:p>
-            <a:r>
-              <a:rPr lang="en-US" dirty="0"/>
-              <a:t>Detecting vehicles turning at junctions without using turn signal lights</a:t>
-            </a:r>
-            <a:r>
-              <a:rPr lang="en-US" dirty="0" smtClean="0"/>
-              <a:t>.</a:t>
-            </a:r>
-          </a:p>
-          <a:p>
-            <a:r>
-              <a:rPr lang="en-US" dirty="0" smtClean="0"/>
-              <a:t>(</a:t>
-            </a:r>
-            <a:r>
-              <a:rPr lang="en-US" dirty="0"/>
-              <a:t>This can be aided by a lane detection model in the previous task)</a:t>
-            </a:r>
-            <a:endParaRPr lang="en-US" dirty="0" smtClean="0"/>
-          </a:p>
-          <a:p>
-            <a:endParaRPr lang="en-US" dirty="0" smtClean="0"/>
-          </a:p>
-        </p:txBody>
-      </p:sp>
-      <p:pic>
-        <p:nvPicPr>
-          <p:cNvPr id="1026" name="Picture 2" descr="How to Build Your Social Media Marketing Strategy | Sprout Social"/>
-          <p:cNvPicPr>
-            <a:picLocks noChangeAspect="1" noChangeArrowheads="1"/>
-          </p:cNvPicPr>
-          <p:nvPr/>
-        </p:nvPicPr>
-        <p:blipFill>
-          <a:blip r:embed="rId2">
-            <a:extLst>
-              <a:ext uri="{28A0092B-C50C-407E-A947-70E740481C1C}">
-                <a14:useLocalDpi xmlns:a14="http://schemas.microsoft.com/office/drawing/2010/main" val="0"/>
-              </a:ext>
-            </a:extLst>
-          </a:blip>
-          <a:srcRect/>
-          <a:stretch>
-            <a:fillRect/>
-          </a:stretch>
-        </p:blipFill>
-        <p:spPr bwMode="auto">
-          <a:xfrm>
-            <a:off x="9555067" y="613612"/>
-            <a:ext cx="2179734" cy="1191126"/>
-          </a:xfrm>
-          <a:prstGeom prst="rect">
-            <a:avLst/>
-          </a:prstGeom>
-          <a:noFill/>
-          <a:extLst>
-            <a:ext uri="{909E8E84-426E-40DD-AFC4-6F175D3DCCD1}">
-              <a14:hiddenFill xmlns:a14="http://schemas.microsoft.com/office/drawing/2010/main">
-                <a:solidFill>
-                  <a:srgbClr val="FFFFFF"/>
-                </a:solidFill>
-              </a14:hiddenFill>
-            </a:ext>
-          </a:extLst>
-        </p:spPr>
-      </p:pic>
-    </p:spTree>
-    <p:extLst>
-      <p:ext uri="{BB962C8B-B14F-4D97-AF65-F5344CB8AC3E}">
-        <p14:creationId xmlns:p14="http://schemas.microsoft.com/office/powerpoint/2010/main" val="4088224590"/>
-      </p:ext>
-    </p:extLst>
-  </p:cSld>
-  <p:clrMapOvr>
-    <a:masterClrMapping/>
-  </p:clrMapOvr>
-</p:sld>
-</file>
-
-<file path=ppt/slides/slide11.xml><?xml version="1.0" encoding="utf-8"?>
-<p:sld xmlns:a="http://schemas.openxmlformats.org/drawingml/2006/main" xmlns:r="http://schemas.openxmlformats.org/officeDocument/2006/relationships" xmlns:p="http://schemas.openxmlformats.org/presentationml/2006/main">
-  <p:cSld>
-    <p:spTree>
-      <p:nvGrpSpPr>
-        <p:cNvPr id="1" name=""/>
-        <p:cNvGrpSpPr/>
-        <p:nvPr/>
-      </p:nvGrpSpPr>
-      <p:grpSpPr>
-        <a:xfrm>
-          <a:off x="0" y="0"/>
-          <a:ext cx="0" cy="0"/>
-          <a:chOff x="0" y="0"/>
-          <a:chExt cx="0" cy="0"/>
-        </a:xfrm>
-      </p:grpSpPr>
-      <p:sp>
-        <p:nvSpPr>
-          <p:cNvPr id="2" name="Title 1"/>
-          <p:cNvSpPr>
-            <a:spLocks noGrp="1"/>
-          </p:cNvSpPr>
-          <p:nvPr>
-            <p:ph type="title"/>
           </p:nvPr>
         </p:nvSpPr>
         <p:spPr/>
@@ -4401,33 +4229,11 @@
           <a:p>
             <a:r>
               <a:rPr lang="en-US" dirty="0"/>
-              <a:t>Thank you.</a:t>
-            </a:r>
-          </a:p>
-        </p:txBody>
-      </p:sp>
-      <p:sp>
-        <p:nvSpPr>
-          <p:cNvPr id="3" name="Content Placeholder 2"/>
-          <p:cNvSpPr>
-            <a:spLocks noGrp="1"/>
-          </p:cNvSpPr>
-          <p:nvPr>
-            <p:ph idx="1"/>
-          </p:nvPr>
-        </p:nvSpPr>
-        <p:spPr/>
-        <p:txBody>
-          <a:bodyPr/>
-          <a:lstStyle/>
-          <a:p>
-            <a:r>
-              <a:rPr lang="en-US" dirty="0"/>
               <a:t>Questions and </a:t>
             </a:r>
             <a:r>
               <a:rPr lang="en-US" dirty="0" smtClean="0"/>
-              <a:t>Answer</a:t>
+              <a:t>Answers.</a:t>
             </a:r>
             <a:endParaRPr lang="en-US" dirty="0"/>
           </a:p>
@@ -4484,11 +4290,7 @@
             </a:r>
             <a:r>
               <a:rPr lang="en-US" b="1" dirty="0" smtClean="0"/>
-              <a:t>Problem (</a:t>
-            </a:r>
-            <a:r>
-              <a:rPr lang="en-US" b="1" dirty="0" smtClean="0"/>
-              <a:t>Recap)</a:t>
+              <a:t>Problem (Recap)</a:t>
             </a:r>
             <a:endParaRPr lang="en-US" dirty="0"/>
           </a:p>
@@ -4584,6 +4386,13 @@
   <p:clrMapOvr>
     <a:masterClrMapping/>
   </p:clrMapOvr>
+  <p:timing>
+    <p:tnLst>
+      <p:par>
+        <p:cTn id="1" dur="indefinite" restart="never" nodeType="tmRoot"/>
+      </p:par>
+    </p:tnLst>
+  </p:timing>
 </p:sld>
 </file>
 
@@ -4647,7 +4456,9 @@
         </p:nvSpPr>
         <p:spPr/>
         <p:txBody>
-          <a:bodyPr anchor="t"/>
+          <a:bodyPr anchor="t">
+            <a:normAutofit fontScale="92500" lnSpcReduction="10000"/>
+          </a:bodyPr>
           <a:lstStyle/>
           <a:p>
             <a:pPr>
@@ -4656,14 +4467,13 @@
               </a:lnSpc>
             </a:pPr>
             <a:r>
+              <a:rPr lang="en-US" dirty="0" smtClean="0"/>
+              <a:t>We </a:t>
+            </a:r>
+            <a:r>
               <a:rPr lang="en-US" dirty="0"/>
-              <a:t>We initially planned to detect the following </a:t>
-            </a:r>
-            <a:r>
-              <a:rPr lang="en-US" dirty="0" smtClean="0"/>
-              <a:t>violations as objectives:</a:t>
-            </a:r>
-            <a:endParaRPr lang="en-US" dirty="0"/>
+              <a:t>initially planned to detect the following violations as objectives:</a:t>
+            </a:r>
           </a:p>
           <a:p>
             <a:pPr lvl="1">
@@ -4695,11 +4505,7 @@
             </a:pPr>
             <a:r>
               <a:rPr lang="en-US" dirty="0"/>
-              <a:t>Detecting illegal parking</a:t>
-            </a:r>
-            <a:r>
-              <a:rPr lang="en-US" dirty="0" smtClean="0"/>
-              <a:t>.</a:t>
+              <a:t>Detecting illegal parking.</a:t>
             </a:r>
           </a:p>
           <a:p>
@@ -4709,14 +4515,54 @@
               </a:lnSpc>
             </a:pPr>
             <a:r>
-              <a:rPr lang="en-US" dirty="0" smtClean="0"/>
+              <a:rPr lang="en-US" dirty="0"/>
               <a:t>Detecting vehicles turning at junctions without using signal lights</a:t>
             </a:r>
             <a:r>
               <a:rPr lang="en-US" dirty="0" smtClean="0"/>
               <a:t>.</a:t>
             </a:r>
+          </a:p>
+          <a:p>
             <a:endParaRPr lang="en-US" dirty="0" smtClean="0"/>
+          </a:p>
+          <a:p>
+            <a:r>
+              <a:rPr lang="en-US" dirty="0" smtClean="0"/>
+              <a:t>We </a:t>
+            </a:r>
+            <a:r>
+              <a:rPr lang="en-US" dirty="0"/>
+              <a:t>narrow the scope to conduct research on vehicle dash camera due to following reason</a:t>
+            </a:r>
+            <a:r>
+              <a:rPr lang="en-US" dirty="0" smtClean="0"/>
+              <a:t>.</a:t>
+            </a:r>
+            <a:endParaRPr lang="en-US" dirty="0"/>
+          </a:p>
+          <a:p>
+            <a:pPr lvl="1"/>
+            <a:r>
+              <a:rPr lang="en-US" dirty="0"/>
+              <a:t>Most of the violations are coming from vehicle dash cameras (assumption)</a:t>
+            </a:r>
+          </a:p>
+          <a:p>
+            <a:pPr lvl="1"/>
+            <a:r>
+              <a:rPr lang="en-US" dirty="0"/>
+              <a:t>Videos capture on traffic violation highly dynamic and hard to train on all aspects.</a:t>
+            </a:r>
+          </a:p>
+          <a:p>
+            <a:pPr marL="324000" lvl="1" indent="0">
+              <a:lnSpc>
+                <a:spcPct val="150000"/>
+              </a:lnSpc>
+              <a:buNone/>
+            </a:pPr>
+            <a:endParaRPr lang="en-US" dirty="0"/>
           </a:p>
         </p:txBody>
       </p:sp>
@@ -4741,8 +4587,8 @@
         </p:blipFill>
         <p:spPr bwMode="auto">
           <a:xfrm>
-            <a:off x="9436663" y="2290650"/>
-            <a:ext cx="1308101" cy="1583596"/>
+            <a:off x="8718927" y="2480633"/>
+            <a:ext cx="1055848" cy="1278217"/>
           </a:xfrm>
           <a:prstGeom prst="rect">
             <a:avLst/>
@@ -4780,8 +4626,8 @@
         </p:blipFill>
         <p:spPr bwMode="auto">
           <a:xfrm>
-            <a:off x="8091300" y="2649513"/>
-            <a:ext cx="1038058" cy="1971564"/>
+            <a:off x="7443600" y="2946399"/>
+            <a:ext cx="752945" cy="1430055"/>
           </a:xfrm>
           <a:prstGeom prst="rect">
             <a:avLst/>
@@ -4819,7 +4665,7 @@
         </p:blipFill>
         <p:spPr bwMode="auto">
           <a:xfrm>
-            <a:off x="9760096" y="4277240"/>
+            <a:off x="9246851" y="4223390"/>
             <a:ext cx="1728956" cy="1436158"/>
           </a:xfrm>
           <a:prstGeom prst="rect">
@@ -4847,6 +4693,13 @@
   <p:clrMapOvr>
     <a:masterClrMapping/>
   </p:clrMapOvr>
+  <p:timing>
+    <p:tnLst>
+      <p:par>
+        <p:cTn id="1" dur="indefinite" restart="never" nodeType="tmRoot"/>
+      </p:par>
+    </p:tnLst>
+  </p:timing>
 </p:sld>
 </file>
 
@@ -5179,6 +5032,13 @@
   <p:clrMapOvr>
     <a:masterClrMapping/>
   </p:clrMapOvr>
+  <p:timing>
+    <p:tnLst>
+      <p:par>
+        <p:cTn id="1" dur="indefinite" restart="never" nodeType="tmRoot"/>
+      </p:par>
+    </p:tnLst>
+  </p:timing>
 </p:sld>
 </file>
 
@@ -5769,56 +5629,12 @@
           <a:lstStyle/>
           <a:p>
             <a:r>
-              <a:rPr lang="en-US" dirty="0">
-                <a:solidFill>
-                  <a:srgbClr val="FF0000"/>
-                </a:solidFill>
-              </a:rPr>
-              <a:t>Most traffic violations are captured by vehicle dash cameras, and they are dynamic.</a:t>
-            </a:r>
-            <a:endParaRPr lang="en-US" dirty="0" smtClean="0">
-              <a:solidFill>
-                <a:srgbClr val="FF0000"/>
-              </a:solidFill>
-            </a:endParaRPr>
-          </a:p>
-          <a:p>
-            <a:r>
-              <a:rPr lang="en-US" dirty="0">
-                <a:solidFill>
-                  <a:srgbClr val="FF0000"/>
-                </a:solidFill>
-              </a:rPr>
-              <a:t>Due to advancements in deep learning (DL) technology for autonomous driving, there are many existing DL models </a:t>
-            </a:r>
-            <a:r>
-              <a:rPr lang="en-US" dirty="0" smtClean="0">
-                <a:solidFill>
-                  <a:srgbClr val="FF0000"/>
-                </a:solidFill>
-              </a:rPr>
-              <a:t>available</a:t>
-            </a:r>
-          </a:p>
-          <a:p>
-            <a:r>
-              <a:rPr lang="en-US" smtClean="0">
-                <a:solidFill>
-                  <a:srgbClr val="FF0000"/>
-                </a:solidFill>
-              </a:rPr>
-              <a:t>Passvive vodice</a:t>
-            </a:r>
-            <a:endParaRPr lang="en-US" dirty="0">
-              <a:solidFill>
-                <a:srgbClr val="FF0000"/>
-              </a:solidFill>
-            </a:endParaRPr>
-          </a:p>
-          <a:p>
-            <a:r>
               <a:rPr lang="en-US" dirty="0" smtClean="0"/>
-              <a:t>Illegal Lane change detection:</a:t>
+              <a:t>Illegal </a:t>
+            </a:r>
+            <a:r>
+              <a:rPr lang="en-US" dirty="0" smtClean="0"/>
+              <a:t>Lane change detection:</a:t>
             </a:r>
           </a:p>
           <a:p>
@@ -5968,7 +5784,19 @@
           <a:p>
             <a:r>
               <a:rPr lang="en-US" b="1" dirty="0" smtClean="0"/>
-              <a:t>Methodology (Cont.…)</a:t>
+              <a:t>Methodology </a:t>
+            </a:r>
+            <a:r>
+              <a:rPr lang="en-US" b="1" dirty="0" smtClean="0"/>
+              <a:t>(</a:t>
+            </a:r>
+            <a:r>
+              <a:rPr lang="en-US" b="1" dirty="0" err="1" smtClean="0"/>
+              <a:t>Cont</a:t>
+            </a:r>
+            <a:r>
+              <a:rPr lang="en-US" b="1" dirty="0" smtClean="0"/>
+              <a:t>…)</a:t>
             </a:r>
             <a:endParaRPr lang="en-US" b="1" dirty="0"/>
           </a:p>
@@ -5984,12 +5812,7 @@
             <p:ph idx="1"/>
           </p:nvPr>
         </p:nvSpPr>
-        <p:spPr>
-          <a:xfrm>
-            <a:off x="581192" y="2180496"/>
-            <a:ext cx="11029615" cy="3678303"/>
-          </a:xfrm>
-        </p:spPr>
+        <p:spPr/>
         <p:txBody>
           <a:bodyPr anchor="t">
             <a:normAutofit/>
@@ -5998,46 +5821,61 @@
           <a:p>
             <a:r>
               <a:rPr lang="en-US" dirty="0" smtClean="0"/>
-              <a:t>Video footages are highly dynamic.</a:t>
-            </a:r>
-          </a:p>
-          <a:p>
+              <a:t>Helmet </a:t>
+            </a:r>
+            <a:r>
+              <a:rPr lang="en-US" dirty="0"/>
+              <a:t>violation </a:t>
+            </a:r>
             <a:r>
               <a:rPr lang="en-US" dirty="0" smtClean="0"/>
-              <a:t>We narrow the scope to conduct research on vehicle dash camera due to following reason.</a:t>
+              <a:t>detection.</a:t>
             </a:r>
           </a:p>
           <a:p>
             <a:pPr lvl="1"/>
             <a:r>
+              <a:rPr lang="en-US" dirty="0"/>
+              <a:t>Planned to use a pre-trained YOLO model and fine-tune it with transfer </a:t>
+            </a:r>
+            <a:r>
               <a:rPr lang="en-US" dirty="0" smtClean="0"/>
-              <a:t>Most of the violations are coming from vehicle dash camera</a:t>
+              <a:t>learning.</a:t>
+            </a:r>
+          </a:p>
+          <a:p>
+            <a:r>
+              <a:rPr lang="en-US" dirty="0"/>
+              <a:t>Illegal parking detection</a:t>
+            </a:r>
+            <a:r>
+              <a:rPr lang="en-US" dirty="0" smtClean="0"/>
+              <a:t>.</a:t>
             </a:r>
           </a:p>
           <a:p>
             <a:pPr lvl="1"/>
             <a:r>
+              <a:rPr lang="en-US" dirty="0"/>
+              <a:t>Planned to use a pre-trained YOLO model and fine-tune it with transfer learning.</a:t>
+            </a:r>
+            <a:endParaRPr lang="en-US" dirty="0" smtClean="0"/>
+          </a:p>
+          <a:p>
+            <a:r>
               <a:rPr lang="en-US" dirty="0" smtClean="0"/>
-              <a:t>Lane detection are highly active area of research due to autonomous drive</a:t>
-            </a:r>
-          </a:p>
-          <a:p>
-            <a:pPr lvl="2"/>
+              <a:t>Illegal turn without signal light</a:t>
+            </a:r>
+          </a:p>
+          <a:p>
+            <a:pPr lvl="1"/>
+            <a:r>
+              <a:rPr lang="en-US" dirty="0"/>
+              <a:t>Illegal turn without a turn </a:t>
+            </a:r>
             <a:r>
               <a:rPr lang="en-US" dirty="0" smtClean="0"/>
-              <a:t>It easy for us to obtain pre-trained models and fine-tune on Sri Lankan roads.</a:t>
-            </a:r>
-          </a:p>
-          <a:p>
-            <a:r>
-              <a:rPr lang="en-US" dirty="0" smtClean="0"/>
-              <a:t>Lane Detection is highly critical for this research </a:t>
-            </a:r>
-          </a:p>
-          <a:p>
-            <a:r>
-              <a:rPr lang="en-US" dirty="0" smtClean="0"/>
-              <a:t>Conducted advance literature review on the subject to cater our need.</a:t>
+              <a:t>signal.</a:t>
             </a:r>
           </a:p>
           <a:p>
@@ -6048,7 +5886,7 @@
     </p:spTree>
     <p:extLst>
       <p:ext uri="{BB962C8B-B14F-4D97-AF65-F5344CB8AC3E}">
-        <p14:creationId xmlns:p14="http://schemas.microsoft.com/office/powerpoint/2010/main" val="1070175154"/>
+        <p14:creationId xmlns:p14="http://schemas.microsoft.com/office/powerpoint/2010/main" val="3511719605"/>
       </p:ext>
     </p:extLst>
   </p:cSld>
@@ -6091,13 +5929,14 @@
           <a:lstStyle/>
           <a:p>
             <a:r>
+              <a:rPr lang="en-US" b="1" dirty="0"/>
+              <a:t>Progress &amp; Key </a:t>
+            </a:r>
+            <a:r>
               <a:rPr lang="en-US" b="1" dirty="0" smtClean="0"/>
-              <a:t>Methodology (</a:t>
-            </a:r>
-            <a:r>
-              <a:rPr lang="en-US" b="1" dirty="0"/>
-              <a:t>Cont.…)</a:t>
-            </a:r>
+              <a:t>Findings</a:t>
+            </a:r>
+            <a:endParaRPr lang="en-US" dirty="0"/>
           </a:p>
         </p:txBody>
       </p:sp>
@@ -6114,243 +5953,106 @@
         <p:spPr/>
         <p:txBody>
           <a:bodyPr anchor="t">
-            <a:normAutofit/>
+            <a:normAutofit lnSpcReduction="10000"/>
           </a:bodyPr>
           <a:lstStyle/>
           <a:p>
             <a:r>
               <a:rPr lang="en-US" dirty="0" smtClean="0"/>
-              <a:t>Lankan roads.</a:t>
-            </a:r>
-          </a:p>
-          <a:p>
-            <a:pPr lvl="1"/>
+              <a:t>As with previously described lane detection is highly important in this research.</a:t>
+            </a:r>
+          </a:p>
+          <a:p>
             <a:r>
               <a:rPr lang="en-US" dirty="0" smtClean="0"/>
-              <a:t>Tools: </a:t>
-            </a:r>
-            <a:r>
-              <a:rPr lang="en-US" b="1" u="sng" dirty="0" err="1" smtClean="0">
-                <a:hlinkClick r:id="rId2"/>
-              </a:rPr>
-              <a:t>LVLane</a:t>
+              <a:t>Initially manual Hough </a:t>
+            </a:r>
+            <a:r>
+              <a:rPr lang="en-US" dirty="0"/>
+              <a:t>Transformation</a:t>
             </a:r>
             <a:r>
               <a:rPr lang="en-US" dirty="0" smtClean="0"/>
-              <a:t> (Spatial CNN variation </a:t>
+              <a:t> </a:t>
             </a:r>
             <a:r>
               <a:rPr lang="en-US" dirty="0"/>
-              <a:t>| </a:t>
-            </a:r>
-            <a:r>
-              <a:rPr lang="en-US" dirty="0" err="1"/>
-              <a:t>pytorch</a:t>
-            </a:r>
+              <a:t>was used for lane detection, but it is not accurate in challenging conditions, such as curved roads that are not fully visible or roads blocked by vehicles</a:t>
+            </a:r>
+            <a:r>
+              <a:rPr lang="en-US" dirty="0" smtClean="0"/>
+              <a:t>.</a:t>
+            </a:r>
+          </a:p>
+          <a:p>
             <a:r>
               <a:rPr lang="en-US" dirty="0"/>
-              <a:t>)</a:t>
-            </a:r>
-            <a:endParaRPr lang="en-US" dirty="0" smtClean="0"/>
-          </a:p>
-          <a:p>
-            <a:r>
-              <a:rPr lang="en-US" dirty="0"/>
-              <a:t>Helmet violation </a:t>
+              <a:t>Then, we switched to a deep learning (DL) model for lane </a:t>
             </a:r>
             <a:r>
               <a:rPr lang="en-US" dirty="0" smtClean="0"/>
               <a:t>detection.</a:t>
             </a:r>
+            <a:endParaRPr lang="en-US" dirty="0" smtClean="0"/>
+          </a:p>
+          <a:p>
+            <a:r>
+              <a:rPr lang="en-US" dirty="0"/>
+              <a:t>There were many libraries available for lane </a:t>
+            </a:r>
+            <a:r>
+              <a:rPr lang="en-US" dirty="0" smtClean="0"/>
+              <a:t>detection thanks to autonomous drive development (active research field).</a:t>
+            </a:r>
+            <a:endParaRPr lang="en-US" dirty="0" smtClean="0"/>
           </a:p>
           <a:p>
             <a:pPr lvl="1"/>
             <a:r>
+              <a:rPr lang="en-US" dirty="0" smtClean="0"/>
+              <a:t>SCNN, Ultra-Fast-Lane</a:t>
+            </a:r>
+            <a:r>
               <a:rPr lang="en-US" dirty="0"/>
-              <a:t>Planned to use a pre-trained YOLO model and fine-tune it with transfer </a:t>
+              <a:t>, </a:t>
             </a:r>
             <a:r>
               <a:rPr lang="en-US" dirty="0" smtClean="0"/>
-              <a:t>learning.</a:t>
-            </a:r>
+              <a:t>, </a:t>
+            </a:r>
+            <a:r>
+              <a:rPr lang="en-US" dirty="0" err="1" smtClean="0"/>
+              <a:t>LVLane</a:t>
+            </a:r>
+            <a:endParaRPr lang="en-US" dirty="0" smtClean="0"/>
           </a:p>
           <a:p>
             <a:r>
               <a:rPr lang="en-US" dirty="0"/>
-              <a:t>Illegal parking detection</a:t>
+              <a:t>But it is critical for us to find the matching lane </a:t>
+            </a:r>
+            <a:r>
+              <a:rPr lang="en-US" dirty="0" smtClean="0"/>
+              <a:t>type for thi</a:t>
+            </a:r>
+            <a:r>
+              <a:rPr lang="en-US" dirty="0" smtClean="0"/>
+              <a:t>s research</a:t>
             </a:r>
             <a:r>
               <a:rPr lang="en-US" dirty="0" smtClean="0"/>
               <a:t>.</a:t>
             </a:r>
-          </a:p>
-          <a:p>
-            <a:pPr lvl="1"/>
+            <a:endParaRPr lang="en-US" dirty="0" smtClean="0"/>
+          </a:p>
+          <a:p>
             <a:r>
               <a:rPr lang="en-US" dirty="0"/>
-              <a:t>Planned to use a pre-trained YOLO model and fine-tune it with transfer learning.</a:t>
-            </a:r>
-            <a:endParaRPr lang="en-US" dirty="0" smtClean="0"/>
-          </a:p>
-          <a:p>
+              <a:t>Conducted an intensive search to find something similar to that one, ensuring it is </a:t>
+            </a:r>
             <a:r>
               <a:rPr lang="en-US" dirty="0" smtClean="0"/>
-              <a:t>Illegal turn without signal light</a:t>
-            </a:r>
-          </a:p>
-          <a:p>
-            <a:pPr lvl="1"/>
-            <a:r>
-              <a:rPr lang="en-US" dirty="0"/>
-              <a:t>Illegal turn without a turn </a:t>
-            </a:r>
-            <a:r>
-              <a:rPr lang="en-US" dirty="0" smtClean="0"/>
-              <a:t>signal.</a:t>
-            </a:r>
-          </a:p>
-          <a:p>
-            <a:endParaRPr lang="en-US" dirty="0"/>
-          </a:p>
-        </p:txBody>
-      </p:sp>
-    </p:spTree>
-    <p:extLst>
-      <p:ext uri="{BB962C8B-B14F-4D97-AF65-F5344CB8AC3E}">
-        <p14:creationId xmlns:p14="http://schemas.microsoft.com/office/powerpoint/2010/main" val="3511719605"/>
-      </p:ext>
-    </p:extLst>
-  </p:cSld>
-  <p:clrMapOvr>
-    <a:masterClrMapping/>
-  </p:clrMapOvr>
-</p:sld>
-</file>
-
-<file path=ppt/slides/slide9.xml><?xml version="1.0" encoding="utf-8"?>
-<p:sld xmlns:a="http://schemas.openxmlformats.org/drawingml/2006/main" xmlns:r="http://schemas.openxmlformats.org/officeDocument/2006/relationships" xmlns:p="http://schemas.openxmlformats.org/presentationml/2006/main">
-  <p:cSld>
-    <p:spTree>
-      <p:nvGrpSpPr>
-        <p:cNvPr id="1" name=""/>
-        <p:cNvGrpSpPr/>
-        <p:nvPr/>
-      </p:nvGrpSpPr>
-      <p:grpSpPr>
-        <a:xfrm>
-          <a:off x="0" y="0"/>
-          <a:ext cx="0" cy="0"/>
-          <a:chOff x="0" y="0"/>
-          <a:chExt cx="0" cy="0"/>
-        </a:xfrm>
-      </p:grpSpPr>
-      <p:sp>
-        <p:nvSpPr>
-          <p:cNvPr id="2" name="Title 1"/>
-          <p:cNvSpPr>
-            <a:spLocks noGrp="1"/>
-          </p:cNvSpPr>
-          <p:nvPr>
-            <p:ph type="title"/>
-          </p:nvPr>
-        </p:nvSpPr>
-        <p:spPr/>
-        <p:txBody>
-          <a:bodyPr/>
-          <a:lstStyle/>
-          <a:p>
-            <a:r>
-              <a:rPr lang="en-US" b="1" dirty="0"/>
-              <a:t>Progress &amp; Key </a:t>
-            </a:r>
-            <a:r>
-              <a:rPr lang="en-US" b="1" dirty="0" smtClean="0"/>
-              <a:t>Findings</a:t>
-            </a:r>
-            <a:endParaRPr lang="en-US" dirty="0"/>
-          </a:p>
-        </p:txBody>
-      </p:sp>
-      <p:sp>
-        <p:nvSpPr>
-          <p:cNvPr id="3" name="Content Placeholder 2"/>
-          <p:cNvSpPr>
-            <a:spLocks noGrp="1"/>
-          </p:cNvSpPr>
-          <p:nvPr>
-            <p:ph idx="1"/>
-          </p:nvPr>
-        </p:nvSpPr>
-        <p:spPr/>
-        <p:txBody>
-          <a:bodyPr anchor="t">
-            <a:normAutofit/>
-          </a:bodyPr>
-          <a:lstStyle/>
-          <a:p>
-            <a:r>
-              <a:rPr lang="en-US" dirty="0"/>
-              <a:t>Initially, Hough Transformation</a:t>
-            </a:r>
-            <a:r>
-              <a:rPr lang="en-US" dirty="0" smtClean="0"/>
-              <a:t> </a:t>
-            </a:r>
-            <a:r>
-              <a:rPr lang="en-US" dirty="0"/>
-              <a:t>was used for lane detection, but it is not accurate in challenging conditions, such as curved roads that are not fully visible or roads blocked by vehicles</a:t>
-            </a:r>
-            <a:r>
-              <a:rPr lang="en-US" dirty="0" smtClean="0"/>
-              <a:t>.</a:t>
-            </a:r>
-          </a:p>
-          <a:p>
-            <a:r>
-              <a:rPr lang="en-US" dirty="0"/>
-              <a:t>Then, we switched to a deep learning (DL) model for lane detection</a:t>
-            </a:r>
-            <a:r>
-              <a:rPr lang="en-US" dirty="0" smtClean="0"/>
-              <a:t>.</a:t>
-            </a:r>
-          </a:p>
-          <a:p>
-            <a:r>
-              <a:rPr lang="en-US" dirty="0"/>
-              <a:t>There were many libraries available for lane detection.</a:t>
-            </a:r>
-            <a:r>
-              <a:rPr lang="en-US" dirty="0" smtClean="0"/>
-              <a:t>.</a:t>
-            </a:r>
-          </a:p>
-          <a:p>
-            <a:pPr lvl="1"/>
-            <a:r>
-              <a:rPr lang="en-US" dirty="0" smtClean="0"/>
-              <a:t>Ultra-Fast-Lane/ SCNN/</a:t>
-            </a:r>
-            <a:r>
-              <a:rPr lang="en-US" dirty="0" err="1" smtClean="0"/>
-              <a:t>LVLane</a:t>
-            </a:r>
-            <a:endParaRPr lang="en-US" dirty="0" smtClean="0"/>
-          </a:p>
-          <a:p>
-            <a:r>
-              <a:rPr lang="en-US" dirty="0"/>
-              <a:t>But it is critical for us to find the matching lane </a:t>
-            </a:r>
-            <a:r>
-              <a:rPr lang="en-US" dirty="0" smtClean="0"/>
-              <a:t>type</a:t>
-            </a:r>
-          </a:p>
-          <a:p>
-            <a:r>
-              <a:rPr lang="en-US" dirty="0"/>
-              <a:t>Conducted an intensive search to find something similar to that one, ensuring it is well-documented</a:t>
+              <a:t>well-documented.</a:t>
             </a:r>
             <a:endParaRPr lang="en-US" dirty="0" smtClean="0"/>
           </a:p>
@@ -6407,6 +6109,318 @@
     <p:extLst>
       <p:ext uri="{BB962C8B-B14F-4D97-AF65-F5344CB8AC3E}">
         <p14:creationId xmlns:p14="http://schemas.microsoft.com/office/powerpoint/2010/main" val="2359823755"/>
+      </p:ext>
+    </p:extLst>
+  </p:cSld>
+  <p:clrMapOvr>
+    <a:masterClrMapping/>
+  </p:clrMapOvr>
+</p:sld>
+</file>
+
+<file path=ppt/slides/slide9.xml><?xml version="1.0" encoding="utf-8"?>
+<p:sld xmlns:a="http://schemas.openxmlformats.org/drawingml/2006/main" xmlns:r="http://schemas.openxmlformats.org/officeDocument/2006/relationships" xmlns:p="http://schemas.openxmlformats.org/presentationml/2006/main">
+  <p:cSld>
+    <p:spTree>
+      <p:nvGrpSpPr>
+        <p:cNvPr id="1" name=""/>
+        <p:cNvGrpSpPr/>
+        <p:nvPr/>
+      </p:nvGrpSpPr>
+      <p:grpSpPr>
+        <a:xfrm>
+          <a:off x="0" y="0"/>
+          <a:ext cx="0" cy="0"/>
+          <a:chOff x="0" y="0"/>
+          <a:chExt cx="0" cy="0"/>
+        </a:xfrm>
+      </p:grpSpPr>
+      <p:sp>
+        <p:nvSpPr>
+          <p:cNvPr id="2" name="Title 1"/>
+          <p:cNvSpPr>
+            <a:spLocks noGrp="1"/>
+          </p:cNvSpPr>
+          <p:nvPr>
+            <p:ph type="title"/>
+          </p:nvPr>
+        </p:nvSpPr>
+        <p:spPr/>
+        <p:txBody>
+          <a:bodyPr/>
+          <a:lstStyle/>
+          <a:p>
+            <a:r>
+              <a:rPr lang="en-US" b="1" dirty="0"/>
+              <a:t>Remaining Work &amp; Future-Plans</a:t>
+            </a:r>
+            <a:endParaRPr lang="en-US" dirty="0"/>
+          </a:p>
+        </p:txBody>
+      </p:sp>
+      <p:sp>
+        <p:nvSpPr>
+          <p:cNvPr id="3" name="Content Placeholder 2"/>
+          <p:cNvSpPr>
+            <a:spLocks noGrp="1"/>
+          </p:cNvSpPr>
+          <p:nvPr>
+            <p:ph idx="1"/>
+          </p:nvPr>
+        </p:nvSpPr>
+        <p:spPr/>
+        <p:txBody>
+          <a:bodyPr anchor="t"/>
+          <a:lstStyle/>
+          <a:p>
+            <a:r>
+              <a:rPr lang="en-US" dirty="0"/>
+              <a:t>The most challenging task is lane violation </a:t>
+            </a:r>
+            <a:r>
+              <a:rPr lang="en-US" dirty="0" smtClean="0"/>
+              <a:t>detection also depends the downstream </a:t>
+            </a:r>
+            <a:r>
+              <a:rPr lang="en-US" dirty="0" smtClean="0"/>
+              <a:t>app(</a:t>
+            </a:r>
+            <a:r>
+              <a:rPr lang="en-US" dirty="0" smtClean="0">
+                <a:solidFill>
+                  <a:schemeClr val="accent5">
+                    <a:lumMod val="50000"/>
+                  </a:schemeClr>
+                </a:solidFill>
+              </a:rPr>
+              <a:t> </a:t>
+            </a:r>
+            <a:r>
+              <a:rPr lang="en-US" dirty="0" smtClean="0">
+                <a:solidFill>
+                  <a:schemeClr val="accent5">
+                    <a:lumMod val="50000"/>
+                  </a:schemeClr>
+                </a:solidFill>
+              </a:rPr>
+              <a:t>Working Progress</a:t>
+            </a:r>
+            <a:r>
+              <a:rPr lang="en-US" dirty="0" smtClean="0"/>
+              <a:t>).</a:t>
+            </a:r>
+            <a:endParaRPr lang="en-US" dirty="0" smtClean="0"/>
+          </a:p>
+          <a:p>
+            <a:pPr lvl="1"/>
+            <a:r>
+              <a:rPr lang="en-US" dirty="0"/>
+              <a:t>Now I am starting to fine-tune it for Sri Lankan </a:t>
+            </a:r>
+            <a:r>
+              <a:rPr lang="en-US" dirty="0" smtClean="0"/>
+              <a:t>lanes ( data processing annotation time consuming task</a:t>
+            </a:r>
+            <a:r>
+              <a:rPr lang="en-US" dirty="0" smtClean="0"/>
+              <a:t>.)</a:t>
+            </a:r>
+          </a:p>
+          <a:p>
+            <a:pPr lvl="1"/>
+            <a:r>
+              <a:rPr lang="en-US" dirty="0" smtClean="0"/>
+              <a:t>Need to cross validate once fined tuned.</a:t>
+            </a:r>
+            <a:endParaRPr lang="en-US" dirty="0" smtClean="0"/>
+          </a:p>
+          <a:p>
+            <a:r>
+              <a:rPr lang="en-US" dirty="0"/>
+              <a:t>Helmet violation detection started with a pre-existing YOLO model; fine-tuning is needed as </a:t>
+            </a:r>
+            <a:r>
+              <a:rPr lang="en-US" dirty="0" smtClean="0"/>
+              <a:t>well</a:t>
+            </a:r>
+            <a:r>
+              <a:rPr lang="en-US" dirty="0" smtClean="0">
+                <a:solidFill>
+                  <a:schemeClr val="accent5">
+                    <a:lumMod val="50000"/>
+                  </a:schemeClr>
+                </a:solidFill>
+              </a:rPr>
+              <a:t>(Not </a:t>
+            </a:r>
+            <a:r>
+              <a:rPr lang="en-US" dirty="0" smtClean="0">
+                <a:solidFill>
+                  <a:schemeClr val="accent5">
+                    <a:lumMod val="50000"/>
+                  </a:schemeClr>
+                </a:solidFill>
+              </a:rPr>
+              <a:t>started</a:t>
+            </a:r>
+            <a:r>
+              <a:rPr lang="en-US" dirty="0" smtClean="0">
+                <a:solidFill>
+                  <a:schemeClr val="accent5">
+                    <a:lumMod val="50000"/>
+                  </a:schemeClr>
+                </a:solidFill>
+              </a:rPr>
+              <a:t>).</a:t>
+            </a:r>
+            <a:endParaRPr lang="en-US" dirty="0" smtClean="0">
+              <a:solidFill>
+                <a:schemeClr val="accent5">
+                  <a:lumMod val="50000"/>
+                </a:schemeClr>
+              </a:solidFill>
+            </a:endParaRPr>
+          </a:p>
+          <a:p>
+            <a:r>
+              <a:rPr lang="en-US" dirty="0" smtClean="0"/>
+              <a:t>Illegal parking violation </a:t>
+            </a:r>
+            <a:r>
+              <a:rPr lang="en-US" dirty="0" smtClean="0"/>
+              <a:t>detection</a:t>
+            </a:r>
+            <a:r>
+              <a:rPr lang="en-US" dirty="0" smtClean="0">
+                <a:solidFill>
+                  <a:schemeClr val="accent5">
+                    <a:lumMod val="50000"/>
+                  </a:schemeClr>
+                </a:solidFill>
+              </a:rPr>
+              <a:t>( </a:t>
+            </a:r>
+            <a:r>
+              <a:rPr lang="en-US" dirty="0" smtClean="0">
+                <a:solidFill>
+                  <a:schemeClr val="accent5">
+                    <a:lumMod val="50000"/>
+                  </a:schemeClr>
+                </a:solidFill>
+              </a:rPr>
+              <a:t>Not started</a:t>
+            </a:r>
+            <a:r>
+              <a:rPr lang="en-US" dirty="0" smtClean="0">
+                <a:solidFill>
+                  <a:schemeClr val="accent5">
+                    <a:lumMod val="50000"/>
+                  </a:schemeClr>
+                </a:solidFill>
+              </a:rPr>
+              <a:t>).</a:t>
+            </a:r>
+            <a:endParaRPr lang="en-US" dirty="0" smtClean="0">
+              <a:solidFill>
+                <a:schemeClr val="accent5">
+                  <a:lumMod val="50000"/>
+                </a:schemeClr>
+              </a:solidFill>
+            </a:endParaRPr>
+          </a:p>
+          <a:p>
+            <a:r>
+              <a:rPr lang="en-US" dirty="0"/>
+              <a:t>Detecting vehicles turning at junctions without using turn signal </a:t>
+            </a:r>
+            <a:r>
+              <a:rPr lang="en-US" dirty="0" smtClean="0"/>
+              <a:t>lights </a:t>
+            </a:r>
+            <a:r>
+              <a:rPr lang="en-US" dirty="0">
+                <a:solidFill>
+                  <a:schemeClr val="accent5">
+                    <a:lumMod val="50000"/>
+                  </a:schemeClr>
+                </a:solidFill>
+              </a:rPr>
+              <a:t>( Not started).</a:t>
+            </a:r>
+            <a:endParaRPr lang="en-US" dirty="0" smtClean="0"/>
+          </a:p>
+          <a:p>
+            <a:pPr marL="0" indent="0">
+              <a:buNone/>
+            </a:pPr>
+            <a:r>
+              <a:rPr lang="en-US" dirty="0"/>
+              <a:t>	</a:t>
+            </a:r>
+            <a:r>
+              <a:rPr lang="en-US" dirty="0" smtClean="0"/>
+              <a:t>(</a:t>
+            </a:r>
+            <a:r>
+              <a:rPr lang="en-US" dirty="0"/>
+              <a:t>This can be aided by a lane detection model in the previous task</a:t>
+            </a:r>
+            <a:r>
+              <a:rPr lang="en-US" dirty="0" smtClean="0"/>
+              <a:t>)</a:t>
+            </a:r>
+            <a:endParaRPr lang="en-US" dirty="0" smtClean="0"/>
+          </a:p>
+          <a:p>
+            <a:endParaRPr lang="en-US" dirty="0" smtClean="0"/>
+          </a:p>
+        </p:txBody>
+      </p:sp>
+      <p:pic>
+        <p:nvPicPr>
+          <p:cNvPr id="1026" name="Picture 2" descr="How to Build Your Social Media Marketing Strategy | Sprout Social"/>
+          <p:cNvPicPr>
+            <a:picLocks noChangeAspect="1" noChangeArrowheads="1"/>
+          </p:cNvPicPr>
+          <p:nvPr/>
+        </p:nvPicPr>
+        <p:blipFill>
+          <a:blip r:embed="rId2">
+            <a:extLst>
+              <a:ext uri="{28A0092B-C50C-407E-A947-70E740481C1C}">
+                <a14:useLocalDpi xmlns:a14="http://schemas.microsoft.com/office/drawing/2010/main" val="0"/>
+              </a:ext>
+            </a:extLst>
+          </a:blip>
+          <a:srcRect/>
+          <a:stretch>
+            <a:fillRect/>
+          </a:stretch>
+        </p:blipFill>
+        <p:spPr bwMode="auto">
+          <a:xfrm>
+            <a:off x="9555067" y="613612"/>
+            <a:ext cx="2179734" cy="1191126"/>
+          </a:xfrm>
+          <a:prstGeom prst="rect">
+            <a:avLst/>
+          </a:prstGeom>
+          <a:noFill/>
+          <a:extLst>
+            <a:ext uri="{909E8E84-426E-40DD-AFC4-6F175D3DCCD1}">
+              <a14:hiddenFill xmlns:a14="http://schemas.microsoft.com/office/drawing/2010/main">
+                <a:solidFill>
+                  <a:srgbClr val="FFFFFF"/>
+                </a:solidFill>
+              </a14:hiddenFill>
+            </a:ext>
+          </a:extLst>
+        </p:spPr>
+      </p:pic>
+    </p:spTree>
+    <p:extLst>
+      <p:ext uri="{BB962C8B-B14F-4D97-AF65-F5344CB8AC3E}">
+        <p14:creationId xmlns:p14="http://schemas.microsoft.com/office/powerpoint/2010/main" val="4088224590"/>
       </p:ext>
     </p:extLst>
   </p:cSld>

</xml_diff>